<commit_message>
new script for 2025 issues update issues pptx
</commit_message>
<xml_diff>
--- a/presentations/progress_27-05-2025.pptx
+++ b/presentations/progress_27-05-2025.pptx
@@ -5,15 +5,20 @@
     <p:sldMasterId id="2147483702" r:id="rId4"/>
   </p:sldMasterIdLst>
   <p:notesMasterIdLst>
-    <p:notesMasterId r:id="rId11"/>
+    <p:notesMasterId r:id="rId16"/>
   </p:notesMasterIdLst>
   <p:sldIdLst>
     <p:sldId id="257" r:id="rId5"/>
     <p:sldId id="278" r:id="rId6"/>
     <p:sldId id="279" r:id="rId7"/>
     <p:sldId id="280" r:id="rId8"/>
-    <p:sldId id="281" r:id="rId9"/>
-    <p:sldId id="282" r:id="rId10"/>
+    <p:sldId id="283" r:id="rId9"/>
+    <p:sldId id="284" r:id="rId10"/>
+    <p:sldId id="285" r:id="rId11"/>
+    <p:sldId id="286" r:id="rId12"/>
+    <p:sldId id="287" r:id="rId13"/>
+    <p:sldId id="281" r:id="rId14"/>
+    <p:sldId id="282" r:id="rId15"/>
   </p:sldIdLst>
   <p:sldSz cx="12192000" cy="6858000"/>
   <p:notesSz cx="6858000" cy="9144000"/>
@@ -130,7 +135,7 @@
 <file path=ppt/revisionInfo.xml><?xml version="1.0" encoding="utf-8"?>
 <p1510:revInfo xmlns:a="http://schemas.openxmlformats.org/drawingml/2006/main" xmlns:r="http://schemas.openxmlformats.org/officeDocument/2006/relationships" xmlns:p1510="http://schemas.microsoft.com/office/powerpoint/2015/10/main">
   <p1510:revLst>
-    <p1510:client id="{43416FA2-236A-46AE-86E2-31D91FFDA117}" v="3" dt="2025-05-27T13:15:58.035"/>
+    <p1510:client id="{43416FA2-236A-46AE-86E2-31D91FFDA117}" v="14" dt="2025-05-28T07:57:49.382"/>
   </p1510:revLst>
 </p1510:revInfo>
 </file>
@@ -139,8 +144,8 @@
 <pc:chgInfo xmlns:a="http://schemas.openxmlformats.org/drawingml/2006/main" xmlns:r="http://schemas.openxmlformats.org/officeDocument/2006/relationships" xmlns:ac="http://schemas.microsoft.com/office/drawing/2013/main/command" xmlns:pc="http://schemas.microsoft.com/office/powerpoint/2013/main/command">
   <pc:docChgLst>
     <pc:chgData name="Demmler Joanne (LUKE)" userId="0ab524ed-dfbe-49c6-9b18-9482d10d55f9" providerId="ADAL" clId="{43416FA2-236A-46AE-86E2-31D91FFDA117}"/>
-    <pc:docChg chg="custSel addSld delSld modSld">
-      <pc:chgData name="Demmler Joanne (LUKE)" userId="0ab524ed-dfbe-49c6-9b18-9482d10d55f9" providerId="ADAL" clId="{43416FA2-236A-46AE-86E2-31D91FFDA117}" dt="2025-05-27T13:40:28.581" v="182" actId="20577"/>
+    <pc:docChg chg="undo custSel addSld delSld modSld">
+      <pc:chgData name="Demmler Joanne (LUKE)" userId="0ab524ed-dfbe-49c6-9b18-9482d10d55f9" providerId="ADAL" clId="{43416FA2-236A-46AE-86E2-31D91FFDA117}" dt="2025-05-28T07:58:04.262" v="261" actId="1076"/>
       <pc:docMkLst>
         <pc:docMk/>
       </pc:docMkLst>
@@ -374,8 +379,8 @@
           </ac:cxnSpMkLst>
         </pc:cxnChg>
       </pc:sldChg>
-      <pc:sldChg chg="modSp add mod">
-        <pc:chgData name="Demmler Joanne (LUKE)" userId="0ab524ed-dfbe-49c6-9b18-9482d10d55f9" providerId="ADAL" clId="{43416FA2-236A-46AE-86E2-31D91FFDA117}" dt="2025-05-27T13:40:16.792" v="176" actId="20577"/>
+      <pc:sldChg chg="addSp delSp modSp add mod">
+        <pc:chgData name="Demmler Joanne (LUKE)" userId="0ab524ed-dfbe-49c6-9b18-9482d10d55f9" providerId="ADAL" clId="{43416FA2-236A-46AE-86E2-31D91FFDA117}" dt="2025-05-28T07:55:10.443" v="235" actId="1076"/>
         <pc:sldMkLst>
           <pc:docMk/>
           <pc:sldMk cId="511030405" sldId="280"/>
@@ -388,6 +393,46 @@
             <ac:spMk id="3" creationId="{9E145EEE-D29D-C0AC-5A2E-5CF13D1FB50C}"/>
           </ac:spMkLst>
         </pc:spChg>
+        <pc:spChg chg="add mod">
+          <ac:chgData name="Demmler Joanne (LUKE)" userId="0ab524ed-dfbe-49c6-9b18-9482d10d55f9" providerId="ADAL" clId="{43416FA2-236A-46AE-86E2-31D91FFDA117}" dt="2025-05-28T07:54:52.952" v="233" actId="14100"/>
+          <ac:spMkLst>
+            <pc:docMk/>
+            <pc:sldMk cId="511030405" sldId="280"/>
+            <ac:spMk id="9" creationId="{1523EE28-26DF-07E3-A308-44CE683A02D5}"/>
+          </ac:spMkLst>
+        </pc:spChg>
+        <pc:spChg chg="add mod">
+          <ac:chgData name="Demmler Joanne (LUKE)" userId="0ab524ed-dfbe-49c6-9b18-9482d10d55f9" providerId="ADAL" clId="{43416FA2-236A-46AE-86E2-31D91FFDA117}" dt="2025-05-28T07:55:10.443" v="235" actId="1076"/>
+          <ac:spMkLst>
+            <pc:docMk/>
+            <pc:sldMk cId="511030405" sldId="280"/>
+            <ac:spMk id="10" creationId="{57318273-1061-426A-B290-025E2D0A0585}"/>
+          </ac:spMkLst>
+        </pc:spChg>
+        <pc:picChg chg="add mod">
+          <ac:chgData name="Demmler Joanne (LUKE)" userId="0ab524ed-dfbe-49c6-9b18-9482d10d55f9" providerId="ADAL" clId="{43416FA2-236A-46AE-86E2-31D91FFDA117}" dt="2025-05-28T07:54:38.692" v="230" actId="1076"/>
+          <ac:picMkLst>
+            <pc:docMk/>
+            <pc:sldMk cId="511030405" sldId="280"/>
+            <ac:picMk id="4" creationId="{12648D27-1260-7B74-13E9-502D4447276A}"/>
+          </ac:picMkLst>
+        </pc:picChg>
+        <pc:picChg chg="add mod">
+          <ac:chgData name="Demmler Joanne (LUKE)" userId="0ab524ed-dfbe-49c6-9b18-9482d10d55f9" providerId="ADAL" clId="{43416FA2-236A-46AE-86E2-31D91FFDA117}" dt="2025-05-28T07:44:41.087" v="197" actId="1076"/>
+          <ac:picMkLst>
+            <pc:docMk/>
+            <pc:sldMk cId="511030405" sldId="280"/>
+            <ac:picMk id="6" creationId="{B682DFEA-B08C-EF51-267E-2D4D1E694B74}"/>
+          </ac:picMkLst>
+        </pc:picChg>
+        <pc:picChg chg="add del mod">
+          <ac:chgData name="Demmler Joanne (LUKE)" userId="0ab524ed-dfbe-49c6-9b18-9482d10d55f9" providerId="ADAL" clId="{43416FA2-236A-46AE-86E2-31D91FFDA117}" dt="2025-05-28T07:44:28.392" v="194" actId="478"/>
+          <ac:picMkLst>
+            <pc:docMk/>
+            <pc:sldMk cId="511030405" sldId="280"/>
+            <ac:picMk id="8" creationId="{735304AA-9D53-CB64-648F-5BAFA830C5C2}"/>
+          </ac:picMkLst>
+        </pc:picChg>
       </pc:sldChg>
       <pc:sldChg chg="modSp add mod">
         <pc:chgData name="Demmler Joanne (LUKE)" userId="0ab524ed-dfbe-49c6-9b18-9482d10d55f9" providerId="ADAL" clId="{43416FA2-236A-46AE-86E2-31D91FFDA117}" dt="2025-05-27T13:40:22.489" v="179" actId="20577"/>
@@ -418,6 +463,281 @@
             <ac:spMk id="3" creationId="{9E145EEE-D29D-C0AC-5A2E-5CF13D1FB50C}"/>
           </ac:spMkLst>
         </pc:spChg>
+      </pc:sldChg>
+      <pc:sldChg chg="addSp delSp modSp add mod">
+        <pc:chgData name="Demmler Joanne (LUKE)" userId="0ab524ed-dfbe-49c6-9b18-9482d10d55f9" providerId="ADAL" clId="{43416FA2-236A-46AE-86E2-31D91FFDA117}" dt="2025-05-28T07:56:46.542" v="248" actId="1076"/>
+        <pc:sldMkLst>
+          <pc:docMk/>
+          <pc:sldMk cId="2965210040" sldId="283"/>
+        </pc:sldMkLst>
+        <pc:spChg chg="add mod">
+          <ac:chgData name="Demmler Joanne (LUKE)" userId="0ab524ed-dfbe-49c6-9b18-9482d10d55f9" providerId="ADAL" clId="{43416FA2-236A-46AE-86E2-31D91FFDA117}" dt="2025-05-28T07:55:54.360" v="240" actId="1076"/>
+          <ac:spMkLst>
+            <pc:docMk/>
+            <pc:sldMk cId="2965210040" sldId="283"/>
+            <ac:spMk id="7" creationId="{8E03E6D5-EA66-E10A-A31C-AA6C6575AAEA}"/>
+          </ac:spMkLst>
+        </pc:spChg>
+        <pc:spChg chg="add mod">
+          <ac:chgData name="Demmler Joanne (LUKE)" userId="0ab524ed-dfbe-49c6-9b18-9482d10d55f9" providerId="ADAL" clId="{43416FA2-236A-46AE-86E2-31D91FFDA117}" dt="2025-05-28T07:56:14.100" v="242" actId="1076"/>
+          <ac:spMkLst>
+            <pc:docMk/>
+            <pc:sldMk cId="2965210040" sldId="283"/>
+            <ac:spMk id="9" creationId="{D111DF16-D694-42C4-E453-789FFB161EBF}"/>
+          </ac:spMkLst>
+        </pc:spChg>
+        <pc:spChg chg="add mod">
+          <ac:chgData name="Demmler Joanne (LUKE)" userId="0ab524ed-dfbe-49c6-9b18-9482d10d55f9" providerId="ADAL" clId="{43416FA2-236A-46AE-86E2-31D91FFDA117}" dt="2025-05-28T07:56:22.810" v="244" actId="1076"/>
+          <ac:spMkLst>
+            <pc:docMk/>
+            <pc:sldMk cId="2965210040" sldId="283"/>
+            <ac:spMk id="10" creationId="{AB475CFC-E1AE-DA35-67D3-CAD082647D1A}"/>
+          </ac:spMkLst>
+        </pc:spChg>
+        <pc:spChg chg="add mod">
+          <ac:chgData name="Demmler Joanne (LUKE)" userId="0ab524ed-dfbe-49c6-9b18-9482d10d55f9" providerId="ADAL" clId="{43416FA2-236A-46AE-86E2-31D91FFDA117}" dt="2025-05-28T07:56:37.256" v="246" actId="1076"/>
+          <ac:spMkLst>
+            <pc:docMk/>
+            <pc:sldMk cId="2965210040" sldId="283"/>
+            <ac:spMk id="11" creationId="{31D209DE-06A9-E728-7188-085CD388DA99}"/>
+          </ac:spMkLst>
+        </pc:spChg>
+        <pc:spChg chg="add mod">
+          <ac:chgData name="Demmler Joanne (LUKE)" userId="0ab524ed-dfbe-49c6-9b18-9482d10d55f9" providerId="ADAL" clId="{43416FA2-236A-46AE-86E2-31D91FFDA117}" dt="2025-05-28T07:56:46.542" v="248" actId="1076"/>
+          <ac:spMkLst>
+            <pc:docMk/>
+            <pc:sldMk cId="2965210040" sldId="283"/>
+            <ac:spMk id="12" creationId="{23232A3D-8DF4-C027-DA1B-CA8A5034B94E}"/>
+          </ac:spMkLst>
+        </pc:spChg>
+        <pc:picChg chg="del">
+          <ac:chgData name="Demmler Joanne (LUKE)" userId="0ab524ed-dfbe-49c6-9b18-9482d10d55f9" providerId="ADAL" clId="{43416FA2-236A-46AE-86E2-31D91FFDA117}" dt="2025-05-28T07:44:22.249" v="192" actId="478"/>
+          <ac:picMkLst>
+            <pc:docMk/>
+            <pc:sldMk cId="2965210040" sldId="283"/>
+            <ac:picMk id="4" creationId="{12648D27-1260-7B74-13E9-502D4447276A}"/>
+          </ac:picMkLst>
+        </pc:picChg>
+        <pc:picChg chg="add mod">
+          <ac:chgData name="Demmler Joanne (LUKE)" userId="0ab524ed-dfbe-49c6-9b18-9482d10d55f9" providerId="ADAL" clId="{43416FA2-236A-46AE-86E2-31D91FFDA117}" dt="2025-05-28T07:45:45.160" v="199" actId="1076"/>
+          <ac:picMkLst>
+            <pc:docMk/>
+            <pc:sldMk cId="2965210040" sldId="283"/>
+            <ac:picMk id="5" creationId="{8AA9CF4A-385E-3CC5-C846-47D9EDFC2E76}"/>
+          </ac:picMkLst>
+        </pc:picChg>
+        <pc:picChg chg="del">
+          <ac:chgData name="Demmler Joanne (LUKE)" userId="0ab524ed-dfbe-49c6-9b18-9482d10d55f9" providerId="ADAL" clId="{43416FA2-236A-46AE-86E2-31D91FFDA117}" dt="2025-05-28T07:44:20.538" v="191" actId="478"/>
+          <ac:picMkLst>
+            <pc:docMk/>
+            <pc:sldMk cId="2965210040" sldId="283"/>
+            <ac:picMk id="6" creationId="{B682DFEA-B08C-EF51-267E-2D4D1E694B74}"/>
+          </ac:picMkLst>
+        </pc:picChg>
+        <pc:picChg chg="mod">
+          <ac:chgData name="Demmler Joanne (LUKE)" userId="0ab524ed-dfbe-49c6-9b18-9482d10d55f9" providerId="ADAL" clId="{43416FA2-236A-46AE-86E2-31D91FFDA117}" dt="2025-05-28T07:55:47.896" v="239" actId="1076"/>
+          <ac:picMkLst>
+            <pc:docMk/>
+            <pc:sldMk cId="2965210040" sldId="283"/>
+            <ac:picMk id="8" creationId="{735304AA-9D53-CB64-648F-5BAFA830C5C2}"/>
+          </ac:picMkLst>
+        </pc:picChg>
+      </pc:sldChg>
+      <pc:sldChg chg="addSp delSp modSp add mod">
+        <pc:chgData name="Demmler Joanne (LUKE)" userId="0ab524ed-dfbe-49c6-9b18-9482d10d55f9" providerId="ADAL" clId="{43416FA2-236A-46AE-86E2-31D91FFDA117}" dt="2025-05-28T07:58:04.262" v="261" actId="1076"/>
+        <pc:sldMkLst>
+          <pc:docMk/>
+          <pc:sldMk cId="474797545" sldId="284"/>
+        </pc:sldMkLst>
+        <pc:spChg chg="add mod">
+          <ac:chgData name="Demmler Joanne (LUKE)" userId="0ab524ed-dfbe-49c6-9b18-9482d10d55f9" providerId="ADAL" clId="{43416FA2-236A-46AE-86E2-31D91FFDA117}" dt="2025-05-28T07:57:40.511" v="258" actId="1076"/>
+          <ac:spMkLst>
+            <pc:docMk/>
+            <pc:sldMk cId="474797545" sldId="284"/>
+            <ac:spMk id="9" creationId="{EF1814F9-1F0F-581A-D166-7E3E06488AB3}"/>
+          </ac:spMkLst>
+        </pc:spChg>
+        <pc:spChg chg="add mod">
+          <ac:chgData name="Demmler Joanne (LUKE)" userId="0ab524ed-dfbe-49c6-9b18-9482d10d55f9" providerId="ADAL" clId="{43416FA2-236A-46AE-86E2-31D91FFDA117}" dt="2025-05-28T07:57:19.545" v="254" actId="1076"/>
+          <ac:spMkLst>
+            <pc:docMk/>
+            <pc:sldMk cId="474797545" sldId="284"/>
+            <ac:spMk id="10" creationId="{955EFBC9-8951-A19B-0F17-932F33E78381}"/>
+          </ac:spMkLst>
+        </pc:spChg>
+        <pc:spChg chg="add mod">
+          <ac:chgData name="Demmler Joanne (LUKE)" userId="0ab524ed-dfbe-49c6-9b18-9482d10d55f9" providerId="ADAL" clId="{43416FA2-236A-46AE-86E2-31D91FFDA117}" dt="2025-05-28T07:57:24.340" v="255" actId="1076"/>
+          <ac:spMkLst>
+            <pc:docMk/>
+            <pc:sldMk cId="474797545" sldId="284"/>
+            <ac:spMk id="11" creationId="{E7401221-AF92-966A-D225-A95B3E9D7BCB}"/>
+          </ac:spMkLst>
+        </pc:spChg>
+        <pc:spChg chg="add mod">
+          <ac:chgData name="Demmler Joanne (LUKE)" userId="0ab524ed-dfbe-49c6-9b18-9482d10d55f9" providerId="ADAL" clId="{43416FA2-236A-46AE-86E2-31D91FFDA117}" dt="2025-05-28T07:58:04.262" v="261" actId="1076"/>
+          <ac:spMkLst>
+            <pc:docMk/>
+            <pc:sldMk cId="474797545" sldId="284"/>
+            <ac:spMk id="12" creationId="{593EAE73-E5CF-E350-53E6-BBCBE3A9FF7D}"/>
+          </ac:spMkLst>
+        </pc:spChg>
+        <pc:spChg chg="add mod">
+          <ac:chgData name="Demmler Joanne (LUKE)" userId="0ab524ed-dfbe-49c6-9b18-9482d10d55f9" providerId="ADAL" clId="{43416FA2-236A-46AE-86E2-31D91FFDA117}" dt="2025-05-28T07:58:00.661" v="260" actId="1076"/>
+          <ac:spMkLst>
+            <pc:docMk/>
+            <pc:sldMk cId="474797545" sldId="284"/>
+            <ac:spMk id="13" creationId="{3DCFED39-6EEA-96B5-EB11-BDF499F7E178}"/>
+          </ac:spMkLst>
+        </pc:spChg>
+        <pc:picChg chg="add mod">
+          <ac:chgData name="Demmler Joanne (LUKE)" userId="0ab524ed-dfbe-49c6-9b18-9482d10d55f9" providerId="ADAL" clId="{43416FA2-236A-46AE-86E2-31D91FFDA117}" dt="2025-05-28T07:46:33.822" v="204" actId="1076"/>
+          <ac:picMkLst>
+            <pc:docMk/>
+            <pc:sldMk cId="474797545" sldId="284"/>
+            <ac:picMk id="4" creationId="{C73EB469-9E0F-D3D0-F0FF-07043EF9C065}"/>
+          </ac:picMkLst>
+        </pc:picChg>
+        <pc:picChg chg="del">
+          <ac:chgData name="Demmler Joanne (LUKE)" userId="0ab524ed-dfbe-49c6-9b18-9482d10d55f9" providerId="ADAL" clId="{43416FA2-236A-46AE-86E2-31D91FFDA117}" dt="2025-05-28T07:45:50.320" v="201" actId="478"/>
+          <ac:picMkLst>
+            <pc:docMk/>
+            <pc:sldMk cId="474797545" sldId="284"/>
+            <ac:picMk id="5" creationId="{8AA9CF4A-385E-3CC5-C846-47D9EDFC2E76}"/>
+          </ac:picMkLst>
+        </pc:picChg>
+        <pc:picChg chg="add mod">
+          <ac:chgData name="Demmler Joanne (LUKE)" userId="0ab524ed-dfbe-49c6-9b18-9482d10d55f9" providerId="ADAL" clId="{43416FA2-236A-46AE-86E2-31D91FFDA117}" dt="2025-05-28T07:47:07.361" v="206" actId="1076"/>
+          <ac:picMkLst>
+            <pc:docMk/>
+            <pc:sldMk cId="474797545" sldId="284"/>
+            <ac:picMk id="7" creationId="{DD1A0930-5096-55C1-DC19-AFFEB905D749}"/>
+          </ac:picMkLst>
+        </pc:picChg>
+        <pc:picChg chg="del">
+          <ac:chgData name="Demmler Joanne (LUKE)" userId="0ab524ed-dfbe-49c6-9b18-9482d10d55f9" providerId="ADAL" clId="{43416FA2-236A-46AE-86E2-31D91FFDA117}" dt="2025-05-28T07:45:51.991" v="202" actId="478"/>
+          <ac:picMkLst>
+            <pc:docMk/>
+            <pc:sldMk cId="474797545" sldId="284"/>
+            <ac:picMk id="8" creationId="{735304AA-9D53-CB64-648F-5BAFA830C5C2}"/>
+          </ac:picMkLst>
+        </pc:picChg>
+      </pc:sldChg>
+      <pc:sldChg chg="addSp delSp modSp add mod">
+        <pc:chgData name="Demmler Joanne (LUKE)" userId="0ab524ed-dfbe-49c6-9b18-9482d10d55f9" providerId="ADAL" clId="{43416FA2-236A-46AE-86E2-31D91FFDA117}" dt="2025-05-28T07:48:23.127" v="213" actId="1076"/>
+        <pc:sldMkLst>
+          <pc:docMk/>
+          <pc:sldMk cId="3154927791" sldId="285"/>
+        </pc:sldMkLst>
+        <pc:picChg chg="del">
+          <ac:chgData name="Demmler Joanne (LUKE)" userId="0ab524ed-dfbe-49c6-9b18-9482d10d55f9" providerId="ADAL" clId="{43416FA2-236A-46AE-86E2-31D91FFDA117}" dt="2025-05-28T07:47:12.080" v="208" actId="478"/>
+          <ac:picMkLst>
+            <pc:docMk/>
+            <pc:sldMk cId="3154927791" sldId="285"/>
+            <ac:picMk id="4" creationId="{C73EB469-9E0F-D3D0-F0FF-07043EF9C065}"/>
+          </ac:picMkLst>
+        </pc:picChg>
+        <pc:picChg chg="add mod">
+          <ac:chgData name="Demmler Joanne (LUKE)" userId="0ab524ed-dfbe-49c6-9b18-9482d10d55f9" providerId="ADAL" clId="{43416FA2-236A-46AE-86E2-31D91FFDA117}" dt="2025-05-28T07:47:46.299" v="211" actId="1076"/>
+          <ac:picMkLst>
+            <pc:docMk/>
+            <pc:sldMk cId="3154927791" sldId="285"/>
+            <ac:picMk id="5" creationId="{5AC1EBB9-51A6-46F3-2EC8-C82D4297BBC4}"/>
+          </ac:picMkLst>
+        </pc:picChg>
+        <pc:picChg chg="del">
+          <ac:chgData name="Demmler Joanne (LUKE)" userId="0ab524ed-dfbe-49c6-9b18-9482d10d55f9" providerId="ADAL" clId="{43416FA2-236A-46AE-86E2-31D91FFDA117}" dt="2025-05-28T07:47:13.696" v="209" actId="478"/>
+          <ac:picMkLst>
+            <pc:docMk/>
+            <pc:sldMk cId="3154927791" sldId="285"/>
+            <ac:picMk id="7" creationId="{DD1A0930-5096-55C1-DC19-AFFEB905D749}"/>
+          </ac:picMkLst>
+        </pc:picChg>
+        <pc:picChg chg="add mod">
+          <ac:chgData name="Demmler Joanne (LUKE)" userId="0ab524ed-dfbe-49c6-9b18-9482d10d55f9" providerId="ADAL" clId="{43416FA2-236A-46AE-86E2-31D91FFDA117}" dt="2025-05-28T07:48:23.127" v="213" actId="1076"/>
+          <ac:picMkLst>
+            <pc:docMk/>
+            <pc:sldMk cId="3154927791" sldId="285"/>
+            <ac:picMk id="8" creationId="{8057F1C0-17BC-BCF8-ED64-6C58E7D4C1B8}"/>
+          </ac:picMkLst>
+        </pc:picChg>
+      </pc:sldChg>
+      <pc:sldChg chg="addSp delSp modSp add mod">
+        <pc:chgData name="Demmler Joanne (LUKE)" userId="0ab524ed-dfbe-49c6-9b18-9482d10d55f9" providerId="ADAL" clId="{43416FA2-236A-46AE-86E2-31D91FFDA117}" dt="2025-05-28T07:49:32.071" v="220" actId="1076"/>
+        <pc:sldMkLst>
+          <pc:docMk/>
+          <pc:sldMk cId="1093402642" sldId="286"/>
+        </pc:sldMkLst>
+        <pc:picChg chg="add mod">
+          <ac:chgData name="Demmler Joanne (LUKE)" userId="0ab524ed-dfbe-49c6-9b18-9482d10d55f9" providerId="ADAL" clId="{43416FA2-236A-46AE-86E2-31D91FFDA117}" dt="2025-05-28T07:48:53.117" v="218" actId="1076"/>
+          <ac:picMkLst>
+            <pc:docMk/>
+            <pc:sldMk cId="1093402642" sldId="286"/>
+            <ac:picMk id="4" creationId="{C87C5048-C660-5FC6-383C-437C9B643DED}"/>
+          </ac:picMkLst>
+        </pc:picChg>
+        <pc:picChg chg="del">
+          <ac:chgData name="Demmler Joanne (LUKE)" userId="0ab524ed-dfbe-49c6-9b18-9482d10d55f9" providerId="ADAL" clId="{43416FA2-236A-46AE-86E2-31D91FFDA117}" dt="2025-05-28T07:48:27.186" v="215" actId="478"/>
+          <ac:picMkLst>
+            <pc:docMk/>
+            <pc:sldMk cId="1093402642" sldId="286"/>
+            <ac:picMk id="5" creationId="{5AC1EBB9-51A6-46F3-2EC8-C82D4297BBC4}"/>
+          </ac:picMkLst>
+        </pc:picChg>
+        <pc:picChg chg="add mod">
+          <ac:chgData name="Demmler Joanne (LUKE)" userId="0ab524ed-dfbe-49c6-9b18-9482d10d55f9" providerId="ADAL" clId="{43416FA2-236A-46AE-86E2-31D91FFDA117}" dt="2025-05-28T07:49:32.071" v="220" actId="1076"/>
+          <ac:picMkLst>
+            <pc:docMk/>
+            <pc:sldMk cId="1093402642" sldId="286"/>
+            <ac:picMk id="7" creationId="{12AA238F-E1E1-6454-8645-2F28EC3800E6}"/>
+          </ac:picMkLst>
+        </pc:picChg>
+        <pc:picChg chg="del">
+          <ac:chgData name="Demmler Joanne (LUKE)" userId="0ab524ed-dfbe-49c6-9b18-9482d10d55f9" providerId="ADAL" clId="{43416FA2-236A-46AE-86E2-31D91FFDA117}" dt="2025-05-28T07:48:28.693" v="216" actId="478"/>
+          <ac:picMkLst>
+            <pc:docMk/>
+            <pc:sldMk cId="1093402642" sldId="286"/>
+            <ac:picMk id="8" creationId="{8057F1C0-17BC-BCF8-ED64-6C58E7D4C1B8}"/>
+          </ac:picMkLst>
+        </pc:picChg>
+      </pc:sldChg>
+      <pc:sldChg chg="addSp delSp modSp add mod">
+        <pc:chgData name="Demmler Joanne (LUKE)" userId="0ab524ed-dfbe-49c6-9b18-9482d10d55f9" providerId="ADAL" clId="{43416FA2-236A-46AE-86E2-31D91FFDA117}" dt="2025-05-28T07:53:41.894" v="227" actId="1076"/>
+        <pc:sldMkLst>
+          <pc:docMk/>
+          <pc:sldMk cId="1211486894" sldId="287"/>
+        </pc:sldMkLst>
+        <pc:picChg chg="del">
+          <ac:chgData name="Demmler Joanne (LUKE)" userId="0ab524ed-dfbe-49c6-9b18-9482d10d55f9" providerId="ADAL" clId="{43416FA2-236A-46AE-86E2-31D91FFDA117}" dt="2025-05-28T07:49:37.273" v="222" actId="478"/>
+          <ac:picMkLst>
+            <pc:docMk/>
+            <pc:sldMk cId="1211486894" sldId="287"/>
+            <ac:picMk id="4" creationId="{C87C5048-C660-5FC6-383C-437C9B643DED}"/>
+          </ac:picMkLst>
+        </pc:picChg>
+        <pc:picChg chg="add mod">
+          <ac:chgData name="Demmler Joanne (LUKE)" userId="0ab524ed-dfbe-49c6-9b18-9482d10d55f9" providerId="ADAL" clId="{43416FA2-236A-46AE-86E2-31D91FFDA117}" dt="2025-05-28T07:51:29.322" v="225" actId="1076"/>
+          <ac:picMkLst>
+            <pc:docMk/>
+            <pc:sldMk cId="1211486894" sldId="287"/>
+            <ac:picMk id="5" creationId="{DA4B7660-6F68-F397-B7AD-48C8BF0733F3}"/>
+          </ac:picMkLst>
+        </pc:picChg>
+        <pc:picChg chg="del">
+          <ac:chgData name="Demmler Joanne (LUKE)" userId="0ab524ed-dfbe-49c6-9b18-9482d10d55f9" providerId="ADAL" clId="{43416FA2-236A-46AE-86E2-31D91FFDA117}" dt="2025-05-28T07:49:38.709" v="223" actId="478"/>
+          <ac:picMkLst>
+            <pc:docMk/>
+            <pc:sldMk cId="1211486894" sldId="287"/>
+            <ac:picMk id="7" creationId="{12AA238F-E1E1-6454-8645-2F28EC3800E6}"/>
+          </ac:picMkLst>
+        </pc:picChg>
+        <pc:picChg chg="add mod">
+          <ac:chgData name="Demmler Joanne (LUKE)" userId="0ab524ed-dfbe-49c6-9b18-9482d10d55f9" providerId="ADAL" clId="{43416FA2-236A-46AE-86E2-31D91FFDA117}" dt="2025-05-28T07:53:41.894" v="227" actId="1076"/>
+          <ac:picMkLst>
+            <pc:docMk/>
+            <pc:sldMk cId="1211486894" sldId="287"/>
+            <ac:picMk id="8" creationId="{5ABD304B-B5FC-7D6D-F3C5-1D2B1C8DE241}"/>
+          </ac:picMkLst>
+        </pc:picChg>
       </pc:sldChg>
     </pc:docChg>
   </pc:docChgLst>
@@ -506,7 +826,7 @@
           <a:p>
             <a:fld id="{84691F95-897A-431E-9F8C-8CF6BFAE769A}" type="datetimeFigureOut">
               <a:rPr lang="fi-FI" smtClean="0"/>
-              <a:t>27.5.2025</a:t>
+              <a:t>28.5.2025</a:t>
             </a:fld>
             <a:endParaRPr lang="fi-FI"/>
           </a:p>
@@ -11088,6 +11408,140 @@
 </p:sld>
 </file>
 
+<file path=ppt/slides/slide10.xml><?xml version="1.0" encoding="utf-8"?>
+<p:sld xmlns:a="http://schemas.openxmlformats.org/drawingml/2006/main" xmlns:r="http://schemas.openxmlformats.org/officeDocument/2006/relationships" xmlns:p="http://schemas.openxmlformats.org/presentationml/2006/main">
+  <p:cSld>
+    <p:spTree>
+      <p:nvGrpSpPr>
+        <p:cNvPr id="1" name=""/>
+        <p:cNvGrpSpPr/>
+        <p:nvPr/>
+      </p:nvGrpSpPr>
+      <p:grpSpPr>
+        <a:xfrm>
+          <a:off x="0" y="0"/>
+          <a:ext cx="0" cy="0"/>
+          <a:chOff x="0" y="0"/>
+          <a:chExt cx="0" cy="0"/>
+        </a:xfrm>
+      </p:grpSpPr>
+      <p:sp>
+        <p:nvSpPr>
+          <p:cNvPr id="3" name="Title 2">
+            <a:extLst>
+              <a:ext uri="{FF2B5EF4-FFF2-40B4-BE49-F238E27FC236}">
+                <a16:creationId xmlns:a16="http://schemas.microsoft.com/office/drawing/2014/main" id="{9E145EEE-D29D-C0AC-5A2E-5CF13D1FB50C}"/>
+              </a:ext>
+            </a:extLst>
+          </p:cNvPr>
+          <p:cNvSpPr>
+            <a:spLocks noGrp="1"/>
+          </p:cNvSpPr>
+          <p:nvPr>
+            <p:ph type="title"/>
+          </p:nvPr>
+        </p:nvSpPr>
+        <p:spPr>
+          <a:xfrm>
+            <a:off x="289517" y="213692"/>
+            <a:ext cx="11114202" cy="945515"/>
+          </a:xfrm>
+        </p:spPr>
+        <p:txBody>
+          <a:bodyPr/>
+          <a:lstStyle/>
+          <a:p>
+            <a:r>
+              <a:rPr lang="fi-FI" dirty="0" err="1"/>
+              <a:t>Issue</a:t>
+            </a:r>
+            <a:r>
+              <a:rPr lang="fi-FI" dirty="0"/>
+              <a:t> 4</a:t>
+            </a:r>
+          </a:p>
+        </p:txBody>
+      </p:sp>
+    </p:spTree>
+    <p:extLst>
+      <p:ext uri="{BB962C8B-B14F-4D97-AF65-F5344CB8AC3E}">
+        <p14:creationId xmlns:p14="http://schemas.microsoft.com/office/powerpoint/2010/main" val="298297979"/>
+      </p:ext>
+    </p:extLst>
+  </p:cSld>
+  <p:clrMapOvr>
+    <a:masterClrMapping/>
+  </p:clrMapOvr>
+</p:sld>
+</file>
+
+<file path=ppt/slides/slide11.xml><?xml version="1.0" encoding="utf-8"?>
+<p:sld xmlns:a="http://schemas.openxmlformats.org/drawingml/2006/main" xmlns:r="http://schemas.openxmlformats.org/officeDocument/2006/relationships" xmlns:p="http://schemas.openxmlformats.org/presentationml/2006/main">
+  <p:cSld>
+    <p:spTree>
+      <p:nvGrpSpPr>
+        <p:cNvPr id="1" name=""/>
+        <p:cNvGrpSpPr/>
+        <p:nvPr/>
+      </p:nvGrpSpPr>
+      <p:grpSpPr>
+        <a:xfrm>
+          <a:off x="0" y="0"/>
+          <a:ext cx="0" cy="0"/>
+          <a:chOff x="0" y="0"/>
+          <a:chExt cx="0" cy="0"/>
+        </a:xfrm>
+      </p:grpSpPr>
+      <p:sp>
+        <p:nvSpPr>
+          <p:cNvPr id="3" name="Title 2">
+            <a:extLst>
+              <a:ext uri="{FF2B5EF4-FFF2-40B4-BE49-F238E27FC236}">
+                <a16:creationId xmlns:a16="http://schemas.microsoft.com/office/drawing/2014/main" id="{9E145EEE-D29D-C0AC-5A2E-5CF13D1FB50C}"/>
+              </a:ext>
+            </a:extLst>
+          </p:cNvPr>
+          <p:cNvSpPr>
+            <a:spLocks noGrp="1"/>
+          </p:cNvSpPr>
+          <p:nvPr>
+            <p:ph type="title"/>
+          </p:nvPr>
+        </p:nvSpPr>
+        <p:spPr>
+          <a:xfrm>
+            <a:off x="289517" y="213692"/>
+            <a:ext cx="11114202" cy="945515"/>
+          </a:xfrm>
+        </p:spPr>
+        <p:txBody>
+          <a:bodyPr/>
+          <a:lstStyle/>
+          <a:p>
+            <a:r>
+              <a:rPr lang="fi-FI" dirty="0" err="1"/>
+              <a:t>Issue</a:t>
+            </a:r>
+            <a:r>
+              <a:rPr lang="fi-FI" dirty="0"/>
+              <a:t> 5</a:t>
+            </a:r>
+          </a:p>
+        </p:txBody>
+      </p:sp>
+    </p:spTree>
+    <p:extLst>
+      <p:ext uri="{BB962C8B-B14F-4D97-AF65-F5344CB8AC3E}">
+        <p14:creationId xmlns:p14="http://schemas.microsoft.com/office/powerpoint/2010/main" val="234987831"/>
+      </p:ext>
+    </p:extLst>
+  </p:cSld>
+  <p:clrMapOvr>
+    <a:masterClrMapping/>
+  </p:clrMapOvr>
+</p:sld>
+</file>
+
 <file path=ppt/slides/slide2.xml><?xml version="1.0" encoding="utf-8"?>
 <p:sld xmlns:a="http://schemas.openxmlformats.org/drawingml/2006/main" xmlns:r="http://schemas.openxmlformats.org/officeDocument/2006/relationships" xmlns:p="http://schemas.openxmlformats.org/presentationml/2006/main">
   <p:cSld>
@@ -11745,6 +12199,142 @@
           </a:p>
         </p:txBody>
       </p:sp>
+      <p:pic>
+        <p:nvPicPr>
+          <p:cNvPr id="4" name="Picture 3">
+            <a:extLst>
+              <a:ext uri="{FF2B5EF4-FFF2-40B4-BE49-F238E27FC236}">
+                <a16:creationId xmlns:a16="http://schemas.microsoft.com/office/drawing/2014/main" id="{12648D27-1260-7B74-13E9-502D4447276A}"/>
+              </a:ext>
+            </a:extLst>
+          </p:cNvPr>
+          <p:cNvPicPr>
+            <a:picLocks noChangeAspect="1"/>
+          </p:cNvPicPr>
+          <p:nvPr/>
+        </p:nvPicPr>
+        <p:blipFill>
+          <a:blip r:embed="rId2"/>
+          <a:stretch>
+            <a:fillRect/>
+          </a:stretch>
+        </p:blipFill>
+        <p:spPr>
+          <a:xfrm>
+            <a:off x="425704" y="1071562"/>
+            <a:ext cx="4457700" cy="4714875"/>
+          </a:xfrm>
+          <a:prstGeom prst="rect">
+            <a:avLst/>
+          </a:prstGeom>
+        </p:spPr>
+      </p:pic>
+      <p:pic>
+        <p:nvPicPr>
+          <p:cNvPr id="6" name="Picture 5">
+            <a:extLst>
+              <a:ext uri="{FF2B5EF4-FFF2-40B4-BE49-F238E27FC236}">
+                <a16:creationId xmlns:a16="http://schemas.microsoft.com/office/drawing/2014/main" id="{B682DFEA-B08C-EF51-267E-2D4D1E694B74}"/>
+              </a:ext>
+            </a:extLst>
+          </p:cNvPr>
+          <p:cNvPicPr>
+            <a:picLocks noChangeAspect="1"/>
+          </p:cNvPicPr>
+          <p:nvPr/>
+        </p:nvPicPr>
+        <p:blipFill>
+          <a:blip r:embed="rId3"/>
+          <a:stretch>
+            <a:fillRect/>
+          </a:stretch>
+        </p:blipFill>
+        <p:spPr>
+          <a:xfrm>
+            <a:off x="5924236" y="1071562"/>
+            <a:ext cx="4438650" cy="5086350"/>
+          </a:xfrm>
+          <a:prstGeom prst="rect">
+            <a:avLst/>
+          </a:prstGeom>
+        </p:spPr>
+      </p:pic>
+      <p:sp>
+        <p:nvSpPr>
+          <p:cNvPr id="9" name="Rectangle 8">
+            <a:extLst>
+              <a:ext uri="{FF2B5EF4-FFF2-40B4-BE49-F238E27FC236}">
+                <a16:creationId xmlns:a16="http://schemas.microsoft.com/office/drawing/2014/main" id="{1523EE28-26DF-07E3-A308-44CE683A02D5}"/>
+              </a:ext>
+            </a:extLst>
+          </p:cNvPr>
+          <p:cNvSpPr/>
+          <p:nvPr/>
+        </p:nvSpPr>
+        <p:spPr>
+          <a:xfrm>
+            <a:off x="289517" y="3307403"/>
+            <a:ext cx="4756308" cy="242131"/>
+          </a:xfrm>
+          <a:prstGeom prst="rect">
+            <a:avLst/>
+          </a:prstGeom>
+          <a:noFill/>
+          <a:ln w="6356" cap="flat">
+            <a:solidFill>
+              <a:srgbClr val="FF0000"/>
+            </a:solidFill>
+            <a:prstDash val="solid"/>
+            <a:miter/>
+          </a:ln>
+        </p:spPr>
+        <p:txBody>
+          <a:bodyPr rtlCol="0" anchor="ctr"/>
+          <a:lstStyle/>
+          <a:p>
+            <a:pPr algn="l"/>
+            <a:endParaRPr lang="fi-FI" dirty="0"/>
+          </a:p>
+        </p:txBody>
+      </p:sp>
+      <p:sp>
+        <p:nvSpPr>
+          <p:cNvPr id="10" name="Rectangle 9">
+            <a:extLst>
+              <a:ext uri="{FF2B5EF4-FFF2-40B4-BE49-F238E27FC236}">
+                <a16:creationId xmlns:a16="http://schemas.microsoft.com/office/drawing/2014/main" id="{57318273-1061-426A-B290-025E2D0A0585}"/>
+              </a:ext>
+            </a:extLst>
+          </p:cNvPr>
+          <p:cNvSpPr/>
+          <p:nvPr/>
+        </p:nvSpPr>
+        <p:spPr>
+          <a:xfrm>
+            <a:off x="5765407" y="3372606"/>
+            <a:ext cx="4756308" cy="242131"/>
+          </a:xfrm>
+          <a:prstGeom prst="rect">
+            <a:avLst/>
+          </a:prstGeom>
+          <a:noFill/>
+          <a:ln w="6356" cap="flat">
+            <a:solidFill>
+              <a:srgbClr val="FF0000"/>
+            </a:solidFill>
+            <a:prstDash val="solid"/>
+            <a:miter/>
+          </a:ln>
+        </p:spPr>
+        <p:txBody>
+          <a:bodyPr rtlCol="0" anchor="ctr"/>
+          <a:lstStyle/>
+          <a:p>
+            <a:pPr algn="l"/>
+            <a:endParaRPr lang="fi-FI" dirty="0"/>
+          </a:p>
+        </p:txBody>
+      </p:sp>
     </p:spTree>
     <p:extLst>
       <p:ext uri="{BB962C8B-B14F-4D97-AF65-F5344CB8AC3E}">
@@ -11807,15 +12397,265 @@
             </a:r>
             <a:r>
               <a:rPr lang="fi-FI" dirty="0"/>
-              <a:t> 4</a:t>
-            </a:r>
+              <a:t> 3</a:t>
+            </a:r>
+          </a:p>
+        </p:txBody>
+      </p:sp>
+      <p:pic>
+        <p:nvPicPr>
+          <p:cNvPr id="8" name="Picture 7">
+            <a:extLst>
+              <a:ext uri="{FF2B5EF4-FFF2-40B4-BE49-F238E27FC236}">
+                <a16:creationId xmlns:a16="http://schemas.microsoft.com/office/drawing/2014/main" id="{735304AA-9D53-CB64-648F-5BAFA830C5C2}"/>
+              </a:ext>
+            </a:extLst>
+          </p:cNvPr>
+          <p:cNvPicPr>
+            <a:picLocks noChangeAspect="1"/>
+          </p:cNvPicPr>
+          <p:nvPr/>
+        </p:nvPicPr>
+        <p:blipFill>
+          <a:blip r:embed="rId2"/>
+          <a:stretch>
+            <a:fillRect/>
+          </a:stretch>
+        </p:blipFill>
+        <p:spPr>
+          <a:xfrm>
+            <a:off x="182500" y="1159207"/>
+            <a:ext cx="4438650" cy="5324475"/>
+          </a:xfrm>
+          <a:prstGeom prst="rect">
+            <a:avLst/>
+          </a:prstGeom>
+        </p:spPr>
+      </p:pic>
+      <p:pic>
+        <p:nvPicPr>
+          <p:cNvPr id="5" name="Picture 4">
+            <a:extLst>
+              <a:ext uri="{FF2B5EF4-FFF2-40B4-BE49-F238E27FC236}">
+                <a16:creationId xmlns:a16="http://schemas.microsoft.com/office/drawing/2014/main" id="{8AA9CF4A-385E-3CC5-C846-47D9EDFC2E76}"/>
+              </a:ext>
+            </a:extLst>
+          </p:cNvPr>
+          <p:cNvPicPr>
+            <a:picLocks noChangeAspect="1"/>
+          </p:cNvPicPr>
+          <p:nvPr/>
+        </p:nvPicPr>
+        <p:blipFill>
+          <a:blip r:embed="rId3"/>
+          <a:stretch>
+            <a:fillRect/>
+          </a:stretch>
+        </p:blipFill>
+        <p:spPr>
+          <a:xfrm>
+            <a:off x="6317912" y="406732"/>
+            <a:ext cx="4400550" cy="6076950"/>
+          </a:xfrm>
+          <a:prstGeom prst="rect">
+            <a:avLst/>
+          </a:prstGeom>
+        </p:spPr>
+      </p:pic>
+      <p:sp>
+        <p:nvSpPr>
+          <p:cNvPr id="7" name="Rectangle 6">
+            <a:extLst>
+              <a:ext uri="{FF2B5EF4-FFF2-40B4-BE49-F238E27FC236}">
+                <a16:creationId xmlns:a16="http://schemas.microsoft.com/office/drawing/2014/main" id="{8E03E6D5-EA66-E10A-A31C-AA6C6575AAEA}"/>
+              </a:ext>
+            </a:extLst>
+          </p:cNvPr>
+          <p:cNvSpPr/>
+          <p:nvPr/>
+        </p:nvSpPr>
+        <p:spPr>
+          <a:xfrm>
+            <a:off x="23671" y="3429000"/>
+            <a:ext cx="4756308" cy="242131"/>
+          </a:xfrm>
+          <a:prstGeom prst="rect">
+            <a:avLst/>
+          </a:prstGeom>
+          <a:noFill/>
+          <a:ln w="6356" cap="flat">
+            <a:solidFill>
+              <a:srgbClr val="FF0000"/>
+            </a:solidFill>
+            <a:prstDash val="solid"/>
+            <a:miter/>
+          </a:ln>
+        </p:spPr>
+        <p:txBody>
+          <a:bodyPr rtlCol="0" anchor="ctr"/>
+          <a:lstStyle/>
+          <a:p>
+            <a:pPr algn="l"/>
+            <a:endParaRPr lang="fi-FI" dirty="0"/>
+          </a:p>
+        </p:txBody>
+      </p:sp>
+      <p:sp>
+        <p:nvSpPr>
+          <p:cNvPr id="9" name="Rectangle 8">
+            <a:extLst>
+              <a:ext uri="{FF2B5EF4-FFF2-40B4-BE49-F238E27FC236}">
+                <a16:creationId xmlns:a16="http://schemas.microsoft.com/office/drawing/2014/main" id="{D111DF16-D694-42C4-E453-789FFB161EBF}"/>
+              </a:ext>
+            </a:extLst>
+          </p:cNvPr>
+          <p:cNvSpPr/>
+          <p:nvPr/>
+        </p:nvSpPr>
+        <p:spPr>
+          <a:xfrm>
+            <a:off x="6140033" y="2900079"/>
+            <a:ext cx="4756308" cy="242131"/>
+          </a:xfrm>
+          <a:prstGeom prst="rect">
+            <a:avLst/>
+          </a:prstGeom>
+          <a:noFill/>
+          <a:ln w="6356" cap="flat">
+            <a:solidFill>
+              <a:srgbClr val="FF0000"/>
+            </a:solidFill>
+            <a:prstDash val="solid"/>
+            <a:miter/>
+          </a:ln>
+        </p:spPr>
+        <p:txBody>
+          <a:bodyPr rtlCol="0" anchor="ctr"/>
+          <a:lstStyle/>
+          <a:p>
+            <a:pPr algn="l"/>
+            <a:endParaRPr lang="fi-FI" dirty="0"/>
+          </a:p>
+        </p:txBody>
+      </p:sp>
+      <p:sp>
+        <p:nvSpPr>
+          <p:cNvPr id="10" name="Rectangle 9">
+            <a:extLst>
+              <a:ext uri="{FF2B5EF4-FFF2-40B4-BE49-F238E27FC236}">
+                <a16:creationId xmlns:a16="http://schemas.microsoft.com/office/drawing/2014/main" id="{AB475CFC-E1AE-DA35-67D3-CAD082647D1A}"/>
+              </a:ext>
+            </a:extLst>
+          </p:cNvPr>
+          <p:cNvSpPr/>
+          <p:nvPr/>
+        </p:nvSpPr>
+        <p:spPr>
+          <a:xfrm>
+            <a:off x="6140033" y="3142210"/>
+            <a:ext cx="4756308" cy="242131"/>
+          </a:xfrm>
+          <a:prstGeom prst="rect">
+            <a:avLst/>
+          </a:prstGeom>
+          <a:noFill/>
+          <a:ln w="6356" cap="flat">
+            <a:solidFill>
+              <a:srgbClr val="FF0000"/>
+            </a:solidFill>
+            <a:prstDash val="solid"/>
+            <a:miter/>
+          </a:ln>
+        </p:spPr>
+        <p:txBody>
+          <a:bodyPr rtlCol="0" anchor="ctr"/>
+          <a:lstStyle/>
+          <a:p>
+            <a:pPr algn="l"/>
+            <a:endParaRPr lang="fi-FI" dirty="0"/>
+          </a:p>
+        </p:txBody>
+      </p:sp>
+      <p:sp>
+        <p:nvSpPr>
+          <p:cNvPr id="11" name="Rectangle 10">
+            <a:extLst>
+              <a:ext uri="{FF2B5EF4-FFF2-40B4-BE49-F238E27FC236}">
+                <a16:creationId xmlns:a16="http://schemas.microsoft.com/office/drawing/2014/main" id="{31D209DE-06A9-E728-7188-085CD388DA99}"/>
+              </a:ext>
+            </a:extLst>
+          </p:cNvPr>
+          <p:cNvSpPr/>
+          <p:nvPr/>
+        </p:nvSpPr>
+        <p:spPr>
+          <a:xfrm>
+            <a:off x="6140033" y="4238429"/>
+            <a:ext cx="4756308" cy="242131"/>
+          </a:xfrm>
+          <a:prstGeom prst="rect">
+            <a:avLst/>
+          </a:prstGeom>
+          <a:noFill/>
+          <a:ln w="6356" cap="flat">
+            <a:solidFill>
+              <a:srgbClr val="FF0000"/>
+            </a:solidFill>
+            <a:prstDash val="solid"/>
+            <a:miter/>
+          </a:ln>
+        </p:spPr>
+        <p:txBody>
+          <a:bodyPr rtlCol="0" anchor="ctr"/>
+          <a:lstStyle/>
+          <a:p>
+            <a:pPr algn="l"/>
+            <a:endParaRPr lang="fi-FI" dirty="0"/>
+          </a:p>
+        </p:txBody>
+      </p:sp>
+      <p:sp>
+        <p:nvSpPr>
+          <p:cNvPr id="12" name="Rectangle 11">
+            <a:extLst>
+              <a:ext uri="{FF2B5EF4-FFF2-40B4-BE49-F238E27FC236}">
+                <a16:creationId xmlns:a16="http://schemas.microsoft.com/office/drawing/2014/main" id="{23232A3D-8DF4-C027-DA1B-CA8A5034B94E}"/>
+              </a:ext>
+            </a:extLst>
+          </p:cNvPr>
+          <p:cNvSpPr/>
+          <p:nvPr/>
+        </p:nvSpPr>
+        <p:spPr>
+          <a:xfrm>
+            <a:off x="6140033" y="5361055"/>
+            <a:ext cx="4756308" cy="242131"/>
+          </a:xfrm>
+          <a:prstGeom prst="rect">
+            <a:avLst/>
+          </a:prstGeom>
+          <a:noFill/>
+          <a:ln w="6356" cap="flat">
+            <a:solidFill>
+              <a:srgbClr val="FF0000"/>
+            </a:solidFill>
+            <a:prstDash val="solid"/>
+            <a:miter/>
+          </a:ln>
+        </p:spPr>
+        <p:txBody>
+          <a:bodyPr rtlCol="0" anchor="ctr"/>
+          <a:lstStyle/>
+          <a:p>
+            <a:pPr algn="l"/>
+            <a:endParaRPr lang="fi-FI" dirty="0"/>
           </a:p>
         </p:txBody>
       </p:sp>
     </p:spTree>
     <p:extLst>
       <p:ext uri="{BB962C8B-B14F-4D97-AF65-F5344CB8AC3E}">
-        <p14:creationId xmlns:p14="http://schemas.microsoft.com/office/powerpoint/2010/main" val="298297979"/>
+        <p14:creationId xmlns:p14="http://schemas.microsoft.com/office/powerpoint/2010/main" val="2965210040"/>
       </p:ext>
     </p:extLst>
   </p:cSld>
@@ -11874,15 +12714,646 @@
             </a:r>
             <a:r>
               <a:rPr lang="fi-FI" dirty="0"/>
-              <a:t> 5</a:t>
-            </a:r>
+              <a:t> 3</a:t>
+            </a:r>
+          </a:p>
+        </p:txBody>
+      </p:sp>
+      <p:pic>
+        <p:nvPicPr>
+          <p:cNvPr id="4" name="Picture 3">
+            <a:extLst>
+              <a:ext uri="{FF2B5EF4-FFF2-40B4-BE49-F238E27FC236}">
+                <a16:creationId xmlns:a16="http://schemas.microsoft.com/office/drawing/2014/main" id="{C73EB469-9E0F-D3D0-F0FF-07043EF9C065}"/>
+              </a:ext>
+            </a:extLst>
+          </p:cNvPr>
+          <p:cNvPicPr>
+            <a:picLocks noChangeAspect="1"/>
+          </p:cNvPicPr>
+          <p:nvPr/>
+        </p:nvPicPr>
+        <p:blipFill>
+          <a:blip r:embed="rId2"/>
+          <a:stretch>
+            <a:fillRect/>
+          </a:stretch>
+        </p:blipFill>
+        <p:spPr>
+          <a:xfrm>
+            <a:off x="364585" y="834058"/>
+            <a:ext cx="4400550" cy="5810250"/>
+          </a:xfrm>
+          <a:prstGeom prst="rect">
+            <a:avLst/>
+          </a:prstGeom>
+        </p:spPr>
+      </p:pic>
+      <p:pic>
+        <p:nvPicPr>
+          <p:cNvPr id="7" name="Picture 6">
+            <a:extLst>
+              <a:ext uri="{FF2B5EF4-FFF2-40B4-BE49-F238E27FC236}">
+                <a16:creationId xmlns:a16="http://schemas.microsoft.com/office/drawing/2014/main" id="{DD1A0930-5096-55C1-DC19-AFFEB905D749}"/>
+              </a:ext>
+            </a:extLst>
+          </p:cNvPr>
+          <p:cNvPicPr>
+            <a:picLocks noChangeAspect="1"/>
+          </p:cNvPicPr>
+          <p:nvPr/>
+        </p:nvPicPr>
+        <p:blipFill>
+          <a:blip r:embed="rId3"/>
+          <a:stretch>
+            <a:fillRect/>
+          </a:stretch>
+        </p:blipFill>
+        <p:spPr>
+          <a:xfrm>
+            <a:off x="5986766" y="805483"/>
+            <a:ext cx="4362450" cy="5838825"/>
+          </a:xfrm>
+          <a:prstGeom prst="rect">
+            <a:avLst/>
+          </a:prstGeom>
+        </p:spPr>
+      </p:pic>
+      <p:sp>
+        <p:nvSpPr>
+          <p:cNvPr id="9" name="Rectangle 8">
+            <a:extLst>
+              <a:ext uri="{FF2B5EF4-FFF2-40B4-BE49-F238E27FC236}">
+                <a16:creationId xmlns:a16="http://schemas.microsoft.com/office/drawing/2014/main" id="{EF1814F9-1F0F-581A-D166-7E3E06488AB3}"/>
+              </a:ext>
+            </a:extLst>
+          </p:cNvPr>
+          <p:cNvSpPr/>
+          <p:nvPr/>
+        </p:nvSpPr>
+        <p:spPr>
+          <a:xfrm>
+            <a:off x="186706" y="5595956"/>
+            <a:ext cx="4756308" cy="242131"/>
+          </a:xfrm>
+          <a:prstGeom prst="rect">
+            <a:avLst/>
+          </a:prstGeom>
+          <a:noFill/>
+          <a:ln w="6356" cap="flat">
+            <a:solidFill>
+              <a:srgbClr val="FF0000"/>
+            </a:solidFill>
+            <a:prstDash val="solid"/>
+            <a:miter/>
+          </a:ln>
+        </p:spPr>
+        <p:txBody>
+          <a:bodyPr rtlCol="0" anchor="ctr"/>
+          <a:lstStyle/>
+          <a:p>
+            <a:pPr algn="l"/>
+            <a:endParaRPr lang="fi-FI" dirty="0"/>
+          </a:p>
+        </p:txBody>
+      </p:sp>
+      <p:sp>
+        <p:nvSpPr>
+          <p:cNvPr id="10" name="Rectangle 9">
+            <a:extLst>
+              <a:ext uri="{FF2B5EF4-FFF2-40B4-BE49-F238E27FC236}">
+                <a16:creationId xmlns:a16="http://schemas.microsoft.com/office/drawing/2014/main" id="{955EFBC9-8951-A19B-0F17-932F33E78381}"/>
+              </a:ext>
+            </a:extLst>
+          </p:cNvPr>
+          <p:cNvSpPr/>
+          <p:nvPr/>
+        </p:nvSpPr>
+        <p:spPr>
+          <a:xfrm>
+            <a:off x="186706" y="4733459"/>
+            <a:ext cx="4756308" cy="242131"/>
+          </a:xfrm>
+          <a:prstGeom prst="rect">
+            <a:avLst/>
+          </a:prstGeom>
+          <a:noFill/>
+          <a:ln w="6356" cap="flat">
+            <a:solidFill>
+              <a:srgbClr val="FF0000"/>
+            </a:solidFill>
+            <a:prstDash val="solid"/>
+            <a:miter/>
+          </a:ln>
+        </p:spPr>
+        <p:txBody>
+          <a:bodyPr rtlCol="0" anchor="ctr"/>
+          <a:lstStyle/>
+          <a:p>
+            <a:pPr algn="l"/>
+            <a:endParaRPr lang="fi-FI" dirty="0"/>
+          </a:p>
+        </p:txBody>
+      </p:sp>
+      <p:sp>
+        <p:nvSpPr>
+          <p:cNvPr id="11" name="Rectangle 10">
+            <a:extLst>
+              <a:ext uri="{FF2B5EF4-FFF2-40B4-BE49-F238E27FC236}">
+                <a16:creationId xmlns:a16="http://schemas.microsoft.com/office/drawing/2014/main" id="{E7401221-AF92-966A-D225-A95B3E9D7BCB}"/>
+              </a:ext>
+            </a:extLst>
+          </p:cNvPr>
+          <p:cNvSpPr/>
+          <p:nvPr/>
+        </p:nvSpPr>
+        <p:spPr>
+          <a:xfrm>
+            <a:off x="186706" y="3307933"/>
+            <a:ext cx="4756308" cy="242131"/>
+          </a:xfrm>
+          <a:prstGeom prst="rect">
+            <a:avLst/>
+          </a:prstGeom>
+          <a:noFill/>
+          <a:ln w="6356" cap="flat">
+            <a:solidFill>
+              <a:srgbClr val="FF0000"/>
+            </a:solidFill>
+            <a:prstDash val="solid"/>
+            <a:miter/>
+          </a:ln>
+        </p:spPr>
+        <p:txBody>
+          <a:bodyPr rtlCol="0" anchor="ctr"/>
+          <a:lstStyle/>
+          <a:p>
+            <a:pPr algn="l"/>
+            <a:endParaRPr lang="fi-FI" dirty="0"/>
+          </a:p>
+        </p:txBody>
+      </p:sp>
+      <p:sp>
+        <p:nvSpPr>
+          <p:cNvPr id="12" name="Rectangle 11">
+            <a:extLst>
+              <a:ext uri="{FF2B5EF4-FFF2-40B4-BE49-F238E27FC236}">
+                <a16:creationId xmlns:a16="http://schemas.microsoft.com/office/drawing/2014/main" id="{593EAE73-E5CF-E350-53E6-BBCBE3A9FF7D}"/>
+              </a:ext>
+            </a:extLst>
+          </p:cNvPr>
+          <p:cNvSpPr/>
+          <p:nvPr/>
+        </p:nvSpPr>
+        <p:spPr>
+          <a:xfrm>
+            <a:off x="186706" y="3603829"/>
+            <a:ext cx="4756308" cy="242131"/>
+          </a:xfrm>
+          <a:prstGeom prst="rect">
+            <a:avLst/>
+          </a:prstGeom>
+          <a:noFill/>
+          <a:ln w="6356" cap="flat">
+            <a:solidFill>
+              <a:srgbClr val="FF0000"/>
+            </a:solidFill>
+            <a:prstDash val="solid"/>
+            <a:miter/>
+          </a:ln>
+        </p:spPr>
+        <p:txBody>
+          <a:bodyPr rtlCol="0" anchor="ctr"/>
+          <a:lstStyle/>
+          <a:p>
+            <a:pPr algn="l"/>
+            <a:endParaRPr lang="fi-FI" dirty="0"/>
+          </a:p>
+        </p:txBody>
+      </p:sp>
+      <p:sp>
+        <p:nvSpPr>
+          <p:cNvPr id="13" name="Rectangle 12">
+            <a:extLst>
+              <a:ext uri="{FF2B5EF4-FFF2-40B4-BE49-F238E27FC236}">
+                <a16:creationId xmlns:a16="http://schemas.microsoft.com/office/drawing/2014/main" id="{3DCFED39-6EEA-96B5-EB11-BDF499F7E178}"/>
+              </a:ext>
+            </a:extLst>
+          </p:cNvPr>
+          <p:cNvSpPr/>
+          <p:nvPr/>
+        </p:nvSpPr>
+        <p:spPr>
+          <a:xfrm>
+            <a:off x="5789837" y="3307932"/>
+            <a:ext cx="4756308" cy="242131"/>
+          </a:xfrm>
+          <a:prstGeom prst="rect">
+            <a:avLst/>
+          </a:prstGeom>
+          <a:noFill/>
+          <a:ln w="6356" cap="flat">
+            <a:solidFill>
+              <a:srgbClr val="FF0000"/>
+            </a:solidFill>
+            <a:prstDash val="solid"/>
+            <a:miter/>
+          </a:ln>
+        </p:spPr>
+        <p:txBody>
+          <a:bodyPr rtlCol="0" anchor="ctr"/>
+          <a:lstStyle/>
+          <a:p>
+            <a:pPr algn="l"/>
+            <a:endParaRPr lang="fi-FI" dirty="0"/>
           </a:p>
         </p:txBody>
       </p:sp>
     </p:spTree>
     <p:extLst>
       <p:ext uri="{BB962C8B-B14F-4D97-AF65-F5344CB8AC3E}">
-        <p14:creationId xmlns:p14="http://schemas.microsoft.com/office/powerpoint/2010/main" val="234987831"/>
+        <p14:creationId xmlns:p14="http://schemas.microsoft.com/office/powerpoint/2010/main" val="474797545"/>
+      </p:ext>
+    </p:extLst>
+  </p:cSld>
+  <p:clrMapOvr>
+    <a:masterClrMapping/>
+  </p:clrMapOvr>
+</p:sld>
+</file>
+
+<file path=ppt/slides/slide7.xml><?xml version="1.0" encoding="utf-8"?>
+<p:sld xmlns:a="http://schemas.openxmlformats.org/drawingml/2006/main" xmlns:r="http://schemas.openxmlformats.org/officeDocument/2006/relationships" xmlns:p="http://schemas.openxmlformats.org/presentationml/2006/main">
+  <p:cSld>
+    <p:spTree>
+      <p:nvGrpSpPr>
+        <p:cNvPr id="1" name=""/>
+        <p:cNvGrpSpPr/>
+        <p:nvPr/>
+      </p:nvGrpSpPr>
+      <p:grpSpPr>
+        <a:xfrm>
+          <a:off x="0" y="0"/>
+          <a:ext cx="0" cy="0"/>
+          <a:chOff x="0" y="0"/>
+          <a:chExt cx="0" cy="0"/>
+        </a:xfrm>
+      </p:grpSpPr>
+      <p:sp>
+        <p:nvSpPr>
+          <p:cNvPr id="3" name="Title 2">
+            <a:extLst>
+              <a:ext uri="{FF2B5EF4-FFF2-40B4-BE49-F238E27FC236}">
+                <a16:creationId xmlns:a16="http://schemas.microsoft.com/office/drawing/2014/main" id="{9E145EEE-D29D-C0AC-5A2E-5CF13D1FB50C}"/>
+              </a:ext>
+            </a:extLst>
+          </p:cNvPr>
+          <p:cNvSpPr>
+            <a:spLocks noGrp="1"/>
+          </p:cNvSpPr>
+          <p:nvPr>
+            <p:ph type="title"/>
+          </p:nvPr>
+        </p:nvSpPr>
+        <p:spPr>
+          <a:xfrm>
+            <a:off x="289517" y="213692"/>
+            <a:ext cx="11114202" cy="945515"/>
+          </a:xfrm>
+        </p:spPr>
+        <p:txBody>
+          <a:bodyPr/>
+          <a:lstStyle/>
+          <a:p>
+            <a:r>
+              <a:rPr lang="fi-FI" dirty="0" err="1"/>
+              <a:t>Issue</a:t>
+            </a:r>
+            <a:r>
+              <a:rPr lang="fi-FI" dirty="0"/>
+              <a:t> 3</a:t>
+            </a:r>
+          </a:p>
+        </p:txBody>
+      </p:sp>
+      <p:pic>
+        <p:nvPicPr>
+          <p:cNvPr id="5" name="Picture 4">
+            <a:extLst>
+              <a:ext uri="{FF2B5EF4-FFF2-40B4-BE49-F238E27FC236}">
+                <a16:creationId xmlns:a16="http://schemas.microsoft.com/office/drawing/2014/main" id="{5AC1EBB9-51A6-46F3-2EC8-C82D4297BBC4}"/>
+              </a:ext>
+            </a:extLst>
+          </p:cNvPr>
+          <p:cNvPicPr>
+            <a:picLocks noChangeAspect="1"/>
+          </p:cNvPicPr>
+          <p:nvPr/>
+        </p:nvPicPr>
+        <p:blipFill>
+          <a:blip r:embed="rId2"/>
+          <a:stretch>
+            <a:fillRect/>
+          </a:stretch>
+        </p:blipFill>
+        <p:spPr>
+          <a:xfrm>
+            <a:off x="442203" y="853108"/>
+            <a:ext cx="4381500" cy="5791200"/>
+          </a:xfrm>
+          <a:prstGeom prst="rect">
+            <a:avLst/>
+          </a:prstGeom>
+        </p:spPr>
+      </p:pic>
+      <p:pic>
+        <p:nvPicPr>
+          <p:cNvPr id="8" name="Picture 7">
+            <a:extLst>
+              <a:ext uri="{FF2B5EF4-FFF2-40B4-BE49-F238E27FC236}">
+                <a16:creationId xmlns:a16="http://schemas.microsoft.com/office/drawing/2014/main" id="{8057F1C0-17BC-BCF8-ED64-6C58E7D4C1B8}"/>
+              </a:ext>
+            </a:extLst>
+          </p:cNvPr>
+          <p:cNvPicPr>
+            <a:picLocks noChangeAspect="1"/>
+          </p:cNvPicPr>
+          <p:nvPr/>
+        </p:nvPicPr>
+        <p:blipFill>
+          <a:blip r:embed="rId3"/>
+          <a:stretch>
+            <a:fillRect/>
+          </a:stretch>
+        </p:blipFill>
+        <p:spPr>
+          <a:xfrm>
+            <a:off x="5846618" y="586408"/>
+            <a:ext cx="4419600" cy="6057900"/>
+          </a:xfrm>
+          <a:prstGeom prst="rect">
+            <a:avLst/>
+          </a:prstGeom>
+        </p:spPr>
+      </p:pic>
+    </p:spTree>
+    <p:extLst>
+      <p:ext uri="{BB962C8B-B14F-4D97-AF65-F5344CB8AC3E}">
+        <p14:creationId xmlns:p14="http://schemas.microsoft.com/office/powerpoint/2010/main" val="3154927791"/>
+      </p:ext>
+    </p:extLst>
+  </p:cSld>
+  <p:clrMapOvr>
+    <a:masterClrMapping/>
+  </p:clrMapOvr>
+</p:sld>
+</file>
+
+<file path=ppt/slides/slide8.xml><?xml version="1.0" encoding="utf-8"?>
+<p:sld xmlns:a="http://schemas.openxmlformats.org/drawingml/2006/main" xmlns:r="http://schemas.openxmlformats.org/officeDocument/2006/relationships" xmlns:p="http://schemas.openxmlformats.org/presentationml/2006/main">
+  <p:cSld>
+    <p:spTree>
+      <p:nvGrpSpPr>
+        <p:cNvPr id="1" name=""/>
+        <p:cNvGrpSpPr/>
+        <p:nvPr/>
+      </p:nvGrpSpPr>
+      <p:grpSpPr>
+        <a:xfrm>
+          <a:off x="0" y="0"/>
+          <a:ext cx="0" cy="0"/>
+          <a:chOff x="0" y="0"/>
+          <a:chExt cx="0" cy="0"/>
+        </a:xfrm>
+      </p:grpSpPr>
+      <p:sp>
+        <p:nvSpPr>
+          <p:cNvPr id="3" name="Title 2">
+            <a:extLst>
+              <a:ext uri="{FF2B5EF4-FFF2-40B4-BE49-F238E27FC236}">
+                <a16:creationId xmlns:a16="http://schemas.microsoft.com/office/drawing/2014/main" id="{9E145EEE-D29D-C0AC-5A2E-5CF13D1FB50C}"/>
+              </a:ext>
+            </a:extLst>
+          </p:cNvPr>
+          <p:cNvSpPr>
+            <a:spLocks noGrp="1"/>
+          </p:cNvSpPr>
+          <p:nvPr>
+            <p:ph type="title"/>
+          </p:nvPr>
+        </p:nvSpPr>
+        <p:spPr>
+          <a:xfrm>
+            <a:off x="289517" y="213692"/>
+            <a:ext cx="11114202" cy="945515"/>
+          </a:xfrm>
+        </p:spPr>
+        <p:txBody>
+          <a:bodyPr/>
+          <a:lstStyle/>
+          <a:p>
+            <a:r>
+              <a:rPr lang="fi-FI" dirty="0" err="1"/>
+              <a:t>Issue</a:t>
+            </a:r>
+            <a:r>
+              <a:rPr lang="fi-FI" dirty="0"/>
+              <a:t> 3</a:t>
+            </a:r>
+          </a:p>
+        </p:txBody>
+      </p:sp>
+      <p:pic>
+        <p:nvPicPr>
+          <p:cNvPr id="4" name="Picture 3">
+            <a:extLst>
+              <a:ext uri="{FF2B5EF4-FFF2-40B4-BE49-F238E27FC236}">
+                <a16:creationId xmlns:a16="http://schemas.microsoft.com/office/drawing/2014/main" id="{C87C5048-C660-5FC6-383C-437C9B643DED}"/>
+              </a:ext>
+            </a:extLst>
+          </p:cNvPr>
+          <p:cNvPicPr>
+            <a:picLocks noChangeAspect="1"/>
+          </p:cNvPicPr>
+          <p:nvPr/>
+        </p:nvPicPr>
+        <p:blipFill>
+          <a:blip r:embed="rId2"/>
+          <a:stretch>
+            <a:fillRect/>
+          </a:stretch>
+        </p:blipFill>
+        <p:spPr>
+          <a:xfrm>
+            <a:off x="374515" y="686449"/>
+            <a:ext cx="4419600" cy="6124575"/>
+          </a:xfrm>
+          <a:prstGeom prst="rect">
+            <a:avLst/>
+          </a:prstGeom>
+        </p:spPr>
+      </p:pic>
+      <p:pic>
+        <p:nvPicPr>
+          <p:cNvPr id="7" name="Picture 6">
+            <a:extLst>
+              <a:ext uri="{FF2B5EF4-FFF2-40B4-BE49-F238E27FC236}">
+                <a16:creationId xmlns:a16="http://schemas.microsoft.com/office/drawing/2014/main" id="{12AA238F-E1E1-6454-8645-2F28EC3800E6}"/>
+              </a:ext>
+            </a:extLst>
+          </p:cNvPr>
+          <p:cNvPicPr>
+            <a:picLocks noChangeAspect="1"/>
+          </p:cNvPicPr>
+          <p:nvPr/>
+        </p:nvPicPr>
+        <p:blipFill>
+          <a:blip r:embed="rId3"/>
+          <a:stretch>
+            <a:fillRect/>
+          </a:stretch>
+        </p:blipFill>
+        <p:spPr>
+          <a:xfrm>
+            <a:off x="5903404" y="686449"/>
+            <a:ext cx="4391025" cy="5829300"/>
+          </a:xfrm>
+          <a:prstGeom prst="rect">
+            <a:avLst/>
+          </a:prstGeom>
+        </p:spPr>
+      </p:pic>
+    </p:spTree>
+    <p:extLst>
+      <p:ext uri="{BB962C8B-B14F-4D97-AF65-F5344CB8AC3E}">
+        <p14:creationId xmlns:p14="http://schemas.microsoft.com/office/powerpoint/2010/main" val="1093402642"/>
+      </p:ext>
+    </p:extLst>
+  </p:cSld>
+  <p:clrMapOvr>
+    <a:masterClrMapping/>
+  </p:clrMapOvr>
+</p:sld>
+</file>
+
+<file path=ppt/slides/slide9.xml><?xml version="1.0" encoding="utf-8"?>
+<p:sld xmlns:a="http://schemas.openxmlformats.org/drawingml/2006/main" xmlns:r="http://schemas.openxmlformats.org/officeDocument/2006/relationships" xmlns:p="http://schemas.openxmlformats.org/presentationml/2006/main">
+  <p:cSld>
+    <p:spTree>
+      <p:nvGrpSpPr>
+        <p:cNvPr id="1" name=""/>
+        <p:cNvGrpSpPr/>
+        <p:nvPr/>
+      </p:nvGrpSpPr>
+      <p:grpSpPr>
+        <a:xfrm>
+          <a:off x="0" y="0"/>
+          <a:ext cx="0" cy="0"/>
+          <a:chOff x="0" y="0"/>
+          <a:chExt cx="0" cy="0"/>
+        </a:xfrm>
+      </p:grpSpPr>
+      <p:sp>
+        <p:nvSpPr>
+          <p:cNvPr id="3" name="Title 2">
+            <a:extLst>
+              <a:ext uri="{FF2B5EF4-FFF2-40B4-BE49-F238E27FC236}">
+                <a16:creationId xmlns:a16="http://schemas.microsoft.com/office/drawing/2014/main" id="{9E145EEE-D29D-C0AC-5A2E-5CF13D1FB50C}"/>
+              </a:ext>
+            </a:extLst>
+          </p:cNvPr>
+          <p:cNvSpPr>
+            <a:spLocks noGrp="1"/>
+          </p:cNvSpPr>
+          <p:nvPr>
+            <p:ph type="title"/>
+          </p:nvPr>
+        </p:nvSpPr>
+        <p:spPr>
+          <a:xfrm>
+            <a:off x="289517" y="213692"/>
+            <a:ext cx="11114202" cy="945515"/>
+          </a:xfrm>
+        </p:spPr>
+        <p:txBody>
+          <a:bodyPr/>
+          <a:lstStyle/>
+          <a:p>
+            <a:r>
+              <a:rPr lang="fi-FI" dirty="0" err="1"/>
+              <a:t>Issue</a:t>
+            </a:r>
+            <a:r>
+              <a:rPr lang="fi-FI" dirty="0"/>
+              <a:t> 3</a:t>
+            </a:r>
+          </a:p>
+        </p:txBody>
+      </p:sp>
+      <p:pic>
+        <p:nvPicPr>
+          <p:cNvPr id="5" name="Picture 4">
+            <a:extLst>
+              <a:ext uri="{FF2B5EF4-FFF2-40B4-BE49-F238E27FC236}">
+                <a16:creationId xmlns:a16="http://schemas.microsoft.com/office/drawing/2014/main" id="{DA4B7660-6F68-F397-B7AD-48C8BF0733F3}"/>
+              </a:ext>
+            </a:extLst>
+          </p:cNvPr>
+          <p:cNvPicPr>
+            <a:picLocks noChangeAspect="1"/>
+          </p:cNvPicPr>
+          <p:nvPr/>
+        </p:nvPicPr>
+        <p:blipFill>
+          <a:blip r:embed="rId2"/>
+          <a:stretch>
+            <a:fillRect/>
+          </a:stretch>
+        </p:blipFill>
+        <p:spPr>
+          <a:xfrm>
+            <a:off x="384243" y="841138"/>
+            <a:ext cx="4419600" cy="5915025"/>
+          </a:xfrm>
+          <a:prstGeom prst="rect">
+            <a:avLst/>
+          </a:prstGeom>
+        </p:spPr>
+      </p:pic>
+      <p:pic>
+        <p:nvPicPr>
+          <p:cNvPr id="8" name="Picture 7">
+            <a:extLst>
+              <a:ext uri="{FF2B5EF4-FFF2-40B4-BE49-F238E27FC236}">
+                <a16:creationId xmlns:a16="http://schemas.microsoft.com/office/drawing/2014/main" id="{5ABD304B-B5FC-7D6D-F3C5-1D2B1C8DE241}"/>
+              </a:ext>
+            </a:extLst>
+          </p:cNvPr>
+          <p:cNvPicPr>
+            <a:picLocks noChangeAspect="1"/>
+          </p:cNvPicPr>
+          <p:nvPr/>
+        </p:nvPicPr>
+        <p:blipFill>
+          <a:blip r:embed="rId3"/>
+          <a:stretch>
+            <a:fillRect/>
+          </a:stretch>
+        </p:blipFill>
+        <p:spPr>
+          <a:xfrm>
+            <a:off x="5898743" y="645570"/>
+            <a:ext cx="4410075" cy="6096000"/>
+          </a:xfrm>
+          <a:prstGeom prst="rect">
+            <a:avLst/>
+          </a:prstGeom>
+        </p:spPr>
+      </p:pic>
+    </p:spTree>
+    <p:extLst>
+      <p:ext uri="{BB962C8B-B14F-4D97-AF65-F5344CB8AC3E}">
+        <p14:creationId xmlns:p14="http://schemas.microsoft.com/office/powerpoint/2010/main" val="1211486894"/>
       </p:ext>
     </p:extLst>
   </p:cSld>
@@ -12452,6 +13923,29 @@
 </file>
 
 <file path=customXml/item1.xml><?xml version="1.0" encoding="utf-8"?>
+<?mso-contentType ?>
+<FormTemplates xmlns="http://schemas.microsoft.com/sharepoint/v3/contenttype/forms">
+  <Display>DocumentLibraryForm</Display>
+  <Edit>DocumentLibraryForm</Edit>
+  <New>DocumentLibraryForm</New>
+</FormTemplates>
+</file>
+
+<file path=customXml/item2.xml><?xml version="1.0" encoding="utf-8"?>
+<p:properties xmlns:p="http://schemas.microsoft.com/office/2006/metadata/properties" xmlns:xsi="http://www.w3.org/2001/XMLSchema-instance" xmlns:pc="http://schemas.microsoft.com/office/infopath/2007/PartnerControls">
+  <documentManagement>
+    <TaxCatchAll xmlns="cfe885dc-9db7-4894-95a4-8bf7ccbac140" xsi:nil="true"/>
+    <lcf76f155ced4ddcb4097134ff3c332f xmlns="91a9d7ce-6a77-4102-930a-119c443f47c2">
+      <Terms xmlns="http://schemas.microsoft.com/office/infopath/2007/PartnerControls"/>
+    </lcf76f155ced4ddcb4097134ff3c332f>
+    <Muokkausoikeudet xmlns="91a9d7ce-6a77-4102-930a-119c443f47c2" xsi:nil="true"/>
+    <K_x00e4_ytt_x00f6_oikeus xmlns="91a9d7ce-6a77-4102-930a-119c443f47c2">Ylläpitäjät</K_x00e4_ytt_x00f6_oikeus>
+    <_Flow_SignoffStatus xmlns="91a9d7ce-6a77-4102-930a-119c443f47c2" xsi:nil="true"/>
+  </documentManagement>
+</p:properties>
+</file>
+
+<file path=customXml/item3.xml><?xml version="1.0" encoding="utf-8"?>
 <ct:contentTypeSchema xmlns:ct="http://schemas.microsoft.com/office/2006/metadata/contentType" xmlns:ma="http://schemas.microsoft.com/office/2006/metadata/properties/metaAttributes" ct:_="" ma:_="" ma:contentTypeName="Asiakirja" ma:contentTypeID="0x010100CD92115659976E468CF8AFBE5938FBC5" ma:contentTypeVersion="17" ma:contentTypeDescription="Luo uusi asiakirja." ma:contentTypeScope="" ma:versionID="d58f48ac7aca6440be92e60dd159f397">
   <xsd:schema xmlns:xsd="http://www.w3.org/2001/XMLSchema" xmlns:xs="http://www.w3.org/2001/XMLSchema" xmlns:p="http://schemas.microsoft.com/office/2006/metadata/properties" xmlns:ns2="91a9d7ce-6a77-4102-930a-119c443f47c2" xmlns:ns3="cfe885dc-9db7-4894-95a4-8bf7ccbac140" xmlns:ns4="35740ea9-8d70-4143-8cdc-95579b01815b" targetNamespace="http://schemas.microsoft.com/office/2006/metadata/properties" ma:root="true" ma:fieldsID="9443dfeba87e877914f27e5d6c6d9ee7" ns2:_="" ns3:_="" ns4:_="">
     <xsd:import namespace="91a9d7ce-6a77-4102-930a-119c443f47c2"/>
@@ -12711,45 +14205,10 @@
 </ct:contentTypeSchema>
 </file>
 
-<file path=customXml/item2.xml><?xml version="1.0" encoding="utf-8"?>
-<p:properties xmlns:p="http://schemas.microsoft.com/office/2006/metadata/properties" xmlns:xsi="http://www.w3.org/2001/XMLSchema-instance" xmlns:pc="http://schemas.microsoft.com/office/infopath/2007/PartnerControls">
-  <documentManagement>
-    <TaxCatchAll xmlns="cfe885dc-9db7-4894-95a4-8bf7ccbac140" xsi:nil="true"/>
-    <lcf76f155ced4ddcb4097134ff3c332f xmlns="91a9d7ce-6a77-4102-930a-119c443f47c2">
-      <Terms xmlns="http://schemas.microsoft.com/office/infopath/2007/PartnerControls"/>
-    </lcf76f155ced4ddcb4097134ff3c332f>
-    <Muokkausoikeudet xmlns="91a9d7ce-6a77-4102-930a-119c443f47c2" xsi:nil="true"/>
-    <K_x00e4_ytt_x00f6_oikeus xmlns="91a9d7ce-6a77-4102-930a-119c443f47c2">Ylläpitäjät</K_x00e4_ytt_x00f6_oikeus>
-    <_Flow_SignoffStatus xmlns="91a9d7ce-6a77-4102-930a-119c443f47c2" xsi:nil="true"/>
-  </documentManagement>
-</p:properties>
-</file>
-
-<file path=customXml/item3.xml><?xml version="1.0" encoding="utf-8"?>
-<?mso-contentType ?>
-<FormTemplates xmlns="http://schemas.microsoft.com/sharepoint/v3/contenttype/forms">
-  <Display>DocumentLibraryForm</Display>
-  <Edit>DocumentLibraryForm</Edit>
-  <New>DocumentLibraryForm</New>
-</FormTemplates>
-</file>
-
 <file path=customXml/itemProps1.xml><?xml version="1.0" encoding="utf-8"?>
-<ds:datastoreItem xmlns:ds="http://schemas.openxmlformats.org/officeDocument/2006/customXml" ds:itemID="{DC594D0F-B137-4BD2-B01D-20CA5568D765}">
+<ds:datastoreItem xmlns:ds="http://schemas.openxmlformats.org/officeDocument/2006/customXml" ds:itemID="{B234DDD8-45CE-46E1-9F6D-F1138BF02E88}">
   <ds:schemaRefs>
-    <ds:schemaRef ds:uri="http://schemas.microsoft.com/office/2006/metadata/contentType"/>
-    <ds:schemaRef ds:uri="http://schemas.microsoft.com/office/2006/metadata/properties/metaAttributes"/>
-    <ds:schemaRef ds:uri="http://www.w3.org/2001/XMLSchema"/>
-    <ds:schemaRef ds:uri="http://schemas.microsoft.com/office/2006/metadata/properties"/>
-    <ds:schemaRef ds:uri="91a9d7ce-6a77-4102-930a-119c443f47c2"/>
-    <ds:schemaRef ds:uri="cfe885dc-9db7-4894-95a4-8bf7ccbac140"/>
-    <ds:schemaRef ds:uri="35740ea9-8d70-4143-8cdc-95579b01815b"/>
-    <ds:schemaRef ds:uri="http://schemas.microsoft.com/office/2006/documentManagement/types"/>
-    <ds:schemaRef ds:uri="http://schemas.microsoft.com/office/infopath/2007/PartnerControls"/>
-    <ds:schemaRef ds:uri="http://schemas.openxmlformats.org/package/2006/metadata/core-properties"/>
-    <ds:schemaRef ds:uri="http://purl.org/dc/elements/1.1/"/>
-    <ds:schemaRef ds:uri="http://purl.org/dc/terms/"/>
-    <ds:schemaRef ds:uri="http://schemas.microsoft.com/internal/obd"/>
+    <ds:schemaRef ds:uri="http://schemas.microsoft.com/sharepoint/v3/contenttype/forms"/>
   </ds:schemaRefs>
 </ds:datastoreItem>
 </file>
@@ -12774,9 +14233,21 @@
 </file>
 
 <file path=customXml/itemProps3.xml><?xml version="1.0" encoding="utf-8"?>
-<ds:datastoreItem xmlns:ds="http://schemas.openxmlformats.org/officeDocument/2006/customXml" ds:itemID="{B234DDD8-45CE-46E1-9F6D-F1138BF02E88}">
+<ds:datastoreItem xmlns:ds="http://schemas.openxmlformats.org/officeDocument/2006/customXml" ds:itemID="{DC594D0F-B137-4BD2-B01D-20CA5568D765}">
   <ds:schemaRefs>
-    <ds:schemaRef ds:uri="http://schemas.microsoft.com/sharepoint/v3/contenttype/forms"/>
+    <ds:schemaRef ds:uri="http://schemas.microsoft.com/office/2006/metadata/contentType"/>
+    <ds:schemaRef ds:uri="http://schemas.microsoft.com/office/2006/metadata/properties/metaAttributes"/>
+    <ds:schemaRef ds:uri="http://www.w3.org/2001/XMLSchema"/>
+    <ds:schemaRef ds:uri="http://schemas.microsoft.com/office/2006/metadata/properties"/>
+    <ds:schemaRef ds:uri="91a9d7ce-6a77-4102-930a-119c443f47c2"/>
+    <ds:schemaRef ds:uri="cfe885dc-9db7-4894-95a4-8bf7ccbac140"/>
+    <ds:schemaRef ds:uri="35740ea9-8d70-4143-8cdc-95579b01815b"/>
+    <ds:schemaRef ds:uri="http://schemas.microsoft.com/office/2006/documentManagement/types"/>
+    <ds:schemaRef ds:uri="http://schemas.microsoft.com/office/infopath/2007/PartnerControls"/>
+    <ds:schemaRef ds:uri="http://schemas.openxmlformats.org/package/2006/metadata/core-properties"/>
+    <ds:schemaRef ds:uri="http://purl.org/dc/elements/1.1/"/>
+    <ds:schemaRef ds:uri="http://purl.org/dc/terms/"/>
+    <ds:schemaRef ds:uri="http://schemas.microsoft.com/internal/obd"/>
   </ds:schemaRefs>
 </ds:datastoreItem>
 </file>

</xml_diff>